<commit_message>
ppt con los resultados de las pruebas
</commit_message>
<xml_diff>
--- a/TP1-Grupo3-v1.pptx
+++ b/TP1-Grupo3-v1.pptx
@@ -23,42 +23,44 @@
     <p:sldId id="268" r:id="rId17"/>
     <p:sldId id="269" r:id="rId18"/>
     <p:sldId id="270" r:id="rId19"/>
+    <p:sldId id="271" r:id="rId20"/>
+    <p:sldId id="272" r:id="rId21"/>
   </p:sldIdLst>
   <p:sldSz cy="5143500" cx="9144000"/>
   <p:notesSz cx="6858000" cy="9144000"/>
   <p:embeddedFontLst>
     <p:embeddedFont>
       <p:font typeface="Montserrat SemiBold"/>
-      <p:regular r:id="rId20"/>
-      <p:bold r:id="rId21"/>
-      <p:italic r:id="rId22"/>
-      <p:boldItalic r:id="rId23"/>
+      <p:regular r:id="rId22"/>
+      <p:bold r:id="rId23"/>
+      <p:italic r:id="rId24"/>
+      <p:boldItalic r:id="rId25"/>
     </p:embeddedFont>
     <p:embeddedFont>
       <p:font typeface="Roboto"/>
-      <p:regular r:id="rId24"/>
-      <p:bold r:id="rId25"/>
-      <p:italic r:id="rId26"/>
-      <p:boldItalic r:id="rId27"/>
+      <p:regular r:id="rId26"/>
+      <p:bold r:id="rId27"/>
+      <p:italic r:id="rId28"/>
+      <p:boldItalic r:id="rId29"/>
     </p:embeddedFont>
     <p:embeddedFont>
       <p:font typeface="Montserrat"/>
-      <p:regular r:id="rId28"/>
-      <p:bold r:id="rId29"/>
-      <p:italic r:id="rId30"/>
-      <p:boldItalic r:id="rId31"/>
+      <p:regular r:id="rId30"/>
+      <p:bold r:id="rId31"/>
+      <p:italic r:id="rId32"/>
+      <p:boldItalic r:id="rId33"/>
     </p:embeddedFont>
     <p:embeddedFont>
       <p:font typeface="Lato"/>
-      <p:regular r:id="rId32"/>
-      <p:bold r:id="rId33"/>
-      <p:italic r:id="rId34"/>
-      <p:boldItalic r:id="rId35"/>
+      <p:regular r:id="rId34"/>
+      <p:bold r:id="rId35"/>
+      <p:italic r:id="rId36"/>
+      <p:boldItalic r:id="rId37"/>
     </p:embeddedFont>
     <p:embeddedFont>
       <p:font typeface="Lato Black"/>
-      <p:bold r:id="rId36"/>
-      <p:boldItalic r:id="rId37"/>
+      <p:bold r:id="rId38"/>
+      <p:boldItalic r:id="rId39"/>
     </p:embeddedFont>
   </p:embeddedFontLst>
   <p:defaultTextStyle>
@@ -972,7 +974,7 @@
       </p:grpSpPr>
       <p:sp>
         <p:nvSpPr>
-          <p:cNvPr id="197" name="Google Shape;197;g27724e2de1a_0_21:notes"/>
+          <p:cNvPr id="197" name="Google Shape;197;g27aebcc0837_0_5:notes"/>
           <p:cNvSpPr/>
           <p:nvPr>
             <p:ph idx="2" type="sldImg"/>
@@ -1007,7 +1009,7 @@
       </p:sp>
       <p:sp>
         <p:nvSpPr>
-          <p:cNvPr id="198" name="Google Shape;198;g27724e2de1a_0_21:notes"/>
+          <p:cNvPr id="198" name="Google Shape;198;g27aebcc0837_0_5:notes"/>
           <p:cNvSpPr txBox="1"/>
           <p:nvPr>
             <p:ph idx="1" type="body"/>
@@ -1057,7 +1059,7 @@
   <p:cSld>
     <p:spTree>
       <p:nvGrpSpPr>
-        <p:cNvPr id="203" name="Shape 203"/>
+        <p:cNvPr id="202" name="Shape 202"/>
         <p:cNvGrpSpPr/>
         <p:nvPr/>
       </p:nvGrpSpPr>
@@ -1071,7 +1073,7 @@
       </p:grpSpPr>
       <p:sp>
         <p:nvSpPr>
-          <p:cNvPr id="204" name="Google Shape;204;g27724e2de1a_0_52:notes"/>
+          <p:cNvPr id="203" name="Google Shape;203;g27724e2de1a_0_21:notes"/>
           <p:cNvSpPr/>
           <p:nvPr>
             <p:ph idx="2" type="sldImg"/>
@@ -1106,7 +1108,7 @@
       </p:sp>
       <p:sp>
         <p:nvSpPr>
-          <p:cNvPr id="205" name="Google Shape;205;g27724e2de1a_0_52:notes"/>
+          <p:cNvPr id="204" name="Google Shape;204;g27724e2de1a_0_21:notes"/>
           <p:cNvSpPr txBox="1"/>
           <p:nvPr>
             <p:ph idx="1" type="body"/>
@@ -1156,7 +1158,7 @@
   <p:cSld>
     <p:spTree>
       <p:nvGrpSpPr>
-        <p:cNvPr id="210" name="Shape 210"/>
+        <p:cNvPr id="209" name="Shape 209"/>
         <p:cNvGrpSpPr/>
         <p:nvPr/>
       </p:nvGrpSpPr>
@@ -1170,7 +1172,7 @@
       </p:grpSpPr>
       <p:sp>
         <p:nvSpPr>
-          <p:cNvPr id="211" name="Google Shape;211;g27724e2de1a_0_47:notes"/>
+          <p:cNvPr id="210" name="Google Shape;210;g27724e2de1a_0_52:notes"/>
           <p:cNvSpPr/>
           <p:nvPr>
             <p:ph idx="2" type="sldImg"/>
@@ -1205,7 +1207,7 @@
       </p:sp>
       <p:sp>
         <p:nvSpPr>
-          <p:cNvPr id="212" name="Google Shape;212;g27724e2de1a_0_47:notes"/>
+          <p:cNvPr id="211" name="Google Shape;211;g27724e2de1a_0_52:notes"/>
           <p:cNvSpPr txBox="1"/>
           <p:nvPr>
             <p:ph idx="1" type="body"/>
@@ -1255,7 +1257,7 @@
   <p:cSld>
     <p:spTree>
       <p:nvGrpSpPr>
-        <p:cNvPr id="217" name="Shape 217"/>
+        <p:cNvPr id="216" name="Shape 216"/>
         <p:cNvGrpSpPr/>
         <p:nvPr/>
       </p:nvGrpSpPr>
@@ -1269,7 +1271,7 @@
       </p:grpSpPr>
       <p:sp>
         <p:nvSpPr>
-          <p:cNvPr id="218" name="Google Shape;218;g27724e2de1a_0_57:notes"/>
+          <p:cNvPr id="217" name="Google Shape;217;g27724e2de1a_0_47:notes"/>
           <p:cNvSpPr/>
           <p:nvPr>
             <p:ph idx="2" type="sldImg"/>
@@ -1304,7 +1306,7 @@
       </p:sp>
       <p:sp>
         <p:nvSpPr>
-          <p:cNvPr id="219" name="Google Shape;219;g27724e2de1a_0_57:notes"/>
+          <p:cNvPr id="218" name="Google Shape;218;g27724e2de1a_0_47:notes"/>
           <p:cNvSpPr txBox="1"/>
           <p:nvPr>
             <p:ph idx="1" type="body"/>
@@ -1368,7 +1370,7 @@
       </p:grpSpPr>
       <p:sp>
         <p:nvSpPr>
-          <p:cNvPr id="224" name="Google Shape;224;g277f60d643b_0_4:notes"/>
+          <p:cNvPr id="224" name="Google Shape;224;g27aebcc0837_0_12:notes"/>
           <p:cNvSpPr/>
           <p:nvPr>
             <p:ph idx="2" type="sldImg"/>
@@ -1403,7 +1405,7 @@
       </p:sp>
       <p:sp>
         <p:nvSpPr>
-          <p:cNvPr id="225" name="Google Shape;225;g277f60d643b_0_4:notes"/>
+          <p:cNvPr id="225" name="Google Shape;225;g27aebcc0837_0_12:notes"/>
           <p:cNvSpPr txBox="1"/>
           <p:nvPr>
             <p:ph idx="1" type="body"/>
@@ -1467,7 +1469,7 @@
       </p:grpSpPr>
       <p:sp>
         <p:nvSpPr>
-          <p:cNvPr id="230" name="Google Shape;230;g27724e2de1a_0_61:notes"/>
+          <p:cNvPr id="230" name="Google Shape;230;g27724e2de1a_0_57:notes"/>
           <p:cNvSpPr/>
           <p:nvPr>
             <p:ph idx="2" type="sldImg"/>
@@ -1502,7 +1504,205 @@
       </p:sp>
       <p:sp>
         <p:nvSpPr>
-          <p:cNvPr id="231" name="Google Shape;231;g27724e2de1a_0_61:notes"/>
+          <p:cNvPr id="231" name="Google Shape;231;g27724e2de1a_0_57:notes"/>
+          <p:cNvSpPr txBox="1"/>
+          <p:nvPr>
+            <p:ph idx="1" type="body"/>
+          </p:nvPr>
+        </p:nvSpPr>
+        <p:spPr>
+          <a:xfrm>
+            <a:off x="685800" y="4343400"/>
+            <a:ext cx="5486400" cy="4114800"/>
+          </a:xfrm>
+          <a:prstGeom prst="rect">
+            <a:avLst/>
+          </a:prstGeom>
+        </p:spPr>
+        <p:txBody>
+          <a:bodyPr anchorCtr="0" anchor="t" bIns="91425" lIns="91425" spcFirstLastPara="1" rIns="91425" wrap="square" tIns="91425">
+            <a:noAutofit/>
+          </a:bodyPr>
+          <a:lstStyle/>
+          <a:p>
+            <a:pPr indent="0" lvl="0" marL="0" rtl="0" algn="l">
+              <a:spcBef>
+                <a:spcPts val="0"/>
+              </a:spcBef>
+              <a:spcAft>
+                <a:spcPts val="0"/>
+              </a:spcAft>
+              <a:buNone/>
+            </a:pPr>
+            <a:r>
+              <a:t/>
+            </a:r>
+            <a:endParaRPr/>
+          </a:p>
+        </p:txBody>
+      </p:sp>
+    </p:spTree>
+  </p:cSld>
+  <p:clrMapOvr>
+    <a:masterClrMapping/>
+  </p:clrMapOvr>
+</p:notes>
+</file>
+
+<file path=ppt/notesSlides/notesSlide16.xml><?xml version="1.0" encoding="utf-8"?>
+<p:notes xmlns:a="http://schemas.openxmlformats.org/drawingml/2006/main" xmlns:r="http://schemas.openxmlformats.org/officeDocument/2006/relationships" xmlns:mc="http://schemas.openxmlformats.org/markup-compatibility/2006" xmlns:mv="urn:schemas-microsoft-com:mac:vml" xmlns:p="http://schemas.openxmlformats.org/presentationml/2006/main" xmlns:c="http://schemas.openxmlformats.org/drawingml/2006/chart" xmlns:dgm="http://schemas.openxmlformats.org/drawingml/2006/diagram" xmlns:o="urn:schemas-microsoft-com:office:office" xmlns:v="urn:schemas-microsoft-com:vml" xmlns:pvml="urn:schemas-microsoft-com:office:powerpoint" xmlns:com="http://schemas.openxmlformats.org/drawingml/2006/compatibility" xmlns:p14="http://schemas.microsoft.com/office/powerpoint/2010/main" xmlns:p15="http://schemas.microsoft.com/office/powerpoint/2012/main" xmlns:ahyp="http://schemas.microsoft.com/office/drawing/2018/hyperlinkcolor" showMasterPhAnim="0" showMasterSp="0">
+  <p:cSld>
+    <p:spTree>
+      <p:nvGrpSpPr>
+        <p:cNvPr id="235" name="Shape 235"/>
+        <p:cNvGrpSpPr/>
+        <p:nvPr/>
+      </p:nvGrpSpPr>
+      <p:grpSpPr>
+        <a:xfrm>
+          <a:off x="0" y="0"/>
+          <a:ext cx="0" cy="0"/>
+          <a:chOff x="0" y="0"/>
+          <a:chExt cx="0" cy="0"/>
+        </a:xfrm>
+      </p:grpSpPr>
+      <p:sp>
+        <p:nvSpPr>
+          <p:cNvPr id="236" name="Google Shape;236;g277f60d643b_0_4:notes"/>
+          <p:cNvSpPr/>
+          <p:nvPr>
+            <p:ph idx="2" type="sldImg"/>
+          </p:nvPr>
+        </p:nvSpPr>
+        <p:spPr>
+          <a:xfrm>
+            <a:off x="381300" y="685800"/>
+            <a:ext cx="6096000" cy="3429000"/>
+          </a:xfrm>
+          <a:custGeom>
+            <a:rect b="b" l="l" r="r" t="t"/>
+            <a:pathLst>
+              <a:path extrusionOk="0" h="120000" w="120000">
+                <a:moveTo>
+                  <a:pt x="0" y="0"/>
+                </a:moveTo>
+                <a:lnTo>
+                  <a:pt x="120000" y="0"/>
+                </a:lnTo>
+                <a:lnTo>
+                  <a:pt x="120000" y="120000"/>
+                </a:lnTo>
+                <a:lnTo>
+                  <a:pt x="0" y="120000"/>
+                </a:lnTo>
+                <a:close/>
+              </a:path>
+            </a:pathLst>
+          </a:custGeom>
+        </p:spPr>
+      </p:sp>
+      <p:sp>
+        <p:nvSpPr>
+          <p:cNvPr id="237" name="Google Shape;237;g277f60d643b_0_4:notes"/>
+          <p:cNvSpPr txBox="1"/>
+          <p:nvPr>
+            <p:ph idx="1" type="body"/>
+          </p:nvPr>
+        </p:nvSpPr>
+        <p:spPr>
+          <a:xfrm>
+            <a:off x="685800" y="4343400"/>
+            <a:ext cx="5486400" cy="4114800"/>
+          </a:xfrm>
+          <a:prstGeom prst="rect">
+            <a:avLst/>
+          </a:prstGeom>
+        </p:spPr>
+        <p:txBody>
+          <a:bodyPr anchorCtr="0" anchor="t" bIns="91425" lIns="91425" spcFirstLastPara="1" rIns="91425" wrap="square" tIns="91425">
+            <a:noAutofit/>
+          </a:bodyPr>
+          <a:lstStyle/>
+          <a:p>
+            <a:pPr indent="0" lvl="0" marL="0" rtl="0" algn="l">
+              <a:spcBef>
+                <a:spcPts val="0"/>
+              </a:spcBef>
+              <a:spcAft>
+                <a:spcPts val="0"/>
+              </a:spcAft>
+              <a:buNone/>
+            </a:pPr>
+            <a:r>
+              <a:t/>
+            </a:r>
+            <a:endParaRPr/>
+          </a:p>
+        </p:txBody>
+      </p:sp>
+    </p:spTree>
+  </p:cSld>
+  <p:clrMapOvr>
+    <a:masterClrMapping/>
+  </p:clrMapOvr>
+</p:notes>
+</file>
+
+<file path=ppt/notesSlides/notesSlide17.xml><?xml version="1.0" encoding="utf-8"?>
+<p:notes xmlns:a="http://schemas.openxmlformats.org/drawingml/2006/main" xmlns:r="http://schemas.openxmlformats.org/officeDocument/2006/relationships" xmlns:mc="http://schemas.openxmlformats.org/markup-compatibility/2006" xmlns:mv="urn:schemas-microsoft-com:mac:vml" xmlns:p="http://schemas.openxmlformats.org/presentationml/2006/main" xmlns:c="http://schemas.openxmlformats.org/drawingml/2006/chart" xmlns:dgm="http://schemas.openxmlformats.org/drawingml/2006/diagram" xmlns:o="urn:schemas-microsoft-com:office:office" xmlns:v="urn:schemas-microsoft-com:vml" xmlns:pvml="urn:schemas-microsoft-com:office:powerpoint" xmlns:com="http://schemas.openxmlformats.org/drawingml/2006/compatibility" xmlns:p14="http://schemas.microsoft.com/office/powerpoint/2010/main" xmlns:p15="http://schemas.microsoft.com/office/powerpoint/2012/main" xmlns:ahyp="http://schemas.microsoft.com/office/drawing/2018/hyperlinkcolor" showMasterPhAnim="0" showMasterSp="0">
+  <p:cSld>
+    <p:spTree>
+      <p:nvGrpSpPr>
+        <p:cNvPr id="241" name="Shape 241"/>
+        <p:cNvGrpSpPr/>
+        <p:nvPr/>
+      </p:nvGrpSpPr>
+      <p:grpSpPr>
+        <a:xfrm>
+          <a:off x="0" y="0"/>
+          <a:ext cx="0" cy="0"/>
+          <a:chOff x="0" y="0"/>
+          <a:chExt cx="0" cy="0"/>
+        </a:xfrm>
+      </p:grpSpPr>
+      <p:sp>
+        <p:nvSpPr>
+          <p:cNvPr id="242" name="Google Shape;242;g27724e2de1a_0_61:notes"/>
+          <p:cNvSpPr/>
+          <p:nvPr>
+            <p:ph idx="2" type="sldImg"/>
+          </p:nvPr>
+        </p:nvSpPr>
+        <p:spPr>
+          <a:xfrm>
+            <a:off x="381300" y="685800"/>
+            <a:ext cx="6096000" cy="3429000"/>
+          </a:xfrm>
+          <a:custGeom>
+            <a:rect b="b" l="l" r="r" t="t"/>
+            <a:pathLst>
+              <a:path extrusionOk="0" h="120000" w="120000">
+                <a:moveTo>
+                  <a:pt x="0" y="0"/>
+                </a:moveTo>
+                <a:lnTo>
+                  <a:pt x="120000" y="0"/>
+                </a:lnTo>
+                <a:lnTo>
+                  <a:pt x="120000" y="120000"/>
+                </a:lnTo>
+                <a:lnTo>
+                  <a:pt x="0" y="120000"/>
+                </a:lnTo>
+                <a:close/>
+              </a:path>
+            </a:pathLst>
+          </a:custGeom>
+        </p:spPr>
+      </p:sp>
+      <p:sp>
+        <p:nvSpPr>
+          <p:cNvPr id="243" name="Google Shape;243;g27724e2de1a_0_61:notes"/>
           <p:cNvSpPr txBox="1"/>
           <p:nvPr>
             <p:ph idx="1" type="body"/>
@@ -10744,6 +10944,446 @@
         <p:nvSpPr>
           <p:cNvPr id="200" name="Google Shape;200;p22"/>
           <p:cNvSpPr txBox="1"/>
+          <p:nvPr/>
+        </p:nvSpPr>
+        <p:spPr>
+          <a:xfrm>
+            <a:off x="570900" y="1120800"/>
+            <a:ext cx="8002200" cy="2901900"/>
+          </a:xfrm>
+          <a:prstGeom prst="rect">
+            <a:avLst/>
+          </a:prstGeom>
+          <a:noFill/>
+          <a:ln>
+            <a:noFill/>
+          </a:ln>
+        </p:spPr>
+        <p:txBody>
+          <a:bodyPr anchorCtr="0" anchor="t" bIns="91425" lIns="91425" spcFirstLastPara="1" rIns="91425" wrap="square" tIns="91425">
+            <a:noAutofit/>
+          </a:bodyPr>
+          <a:lstStyle/>
+          <a:p>
+            <a:pPr indent="0" lvl="0" marL="0" rtl="0" algn="l">
+              <a:lnSpc>
+                <a:spcPct val="115000"/>
+              </a:lnSpc>
+              <a:spcBef>
+                <a:spcPts val="0"/>
+              </a:spcBef>
+              <a:spcAft>
+                <a:spcPts val="0"/>
+              </a:spcAft>
+              <a:buNone/>
+            </a:pPr>
+            <a:r>
+              <a:rPr i="1" lang="en">
+                <a:solidFill>
+                  <a:schemeClr val="lt1"/>
+                </a:solidFill>
+              </a:rPr>
+              <a:t>Para el valor &lt;1&gt;:</a:t>
+            </a:r>
+            <a:endParaRPr i="1">
+              <a:solidFill>
+                <a:schemeClr val="lt1"/>
+              </a:solidFill>
+            </a:endParaRPr>
+          </a:p>
+          <a:p>
+            <a:pPr indent="0" lvl="0" marL="0" rtl="0" algn="l">
+              <a:lnSpc>
+                <a:spcPct val="115000"/>
+              </a:lnSpc>
+              <a:spcBef>
+                <a:spcPts val="0"/>
+              </a:spcBef>
+              <a:spcAft>
+                <a:spcPts val="0"/>
+              </a:spcAft>
+              <a:buNone/>
+            </a:pPr>
+            <a:r>
+              <a:rPr i="1" lang="en">
+                <a:solidFill>
+                  <a:schemeClr val="lt1"/>
+                </a:solidFill>
+              </a:rPr>
+              <a:t>Tiempo de ejecución Prolog: 3.0671834945678712 ms</a:t>
+            </a:r>
+            <a:endParaRPr i="1">
+              <a:solidFill>
+                <a:schemeClr val="lt1"/>
+              </a:solidFill>
+            </a:endParaRPr>
+          </a:p>
+          <a:p>
+            <a:pPr indent="0" lvl="0" marL="0" rtl="0" algn="l">
+              <a:lnSpc>
+                <a:spcPct val="115000"/>
+              </a:lnSpc>
+              <a:spcBef>
+                <a:spcPts val="0"/>
+              </a:spcBef>
+              <a:spcAft>
+                <a:spcPts val="0"/>
+              </a:spcAft>
+              <a:buNone/>
+            </a:pPr>
+            <a:r>
+              <a:rPr i="1" lang="en">
+                <a:solidFill>
+                  <a:schemeClr val="lt1"/>
+                </a:solidFill>
+              </a:rPr>
+              <a:t>Tiempo de ejecución Javascript: </a:t>
+            </a:r>
+            <a:r>
+              <a:rPr i="1" lang="en" sz="1350">
+                <a:solidFill>
+                  <a:schemeClr val="lt1"/>
+                </a:solidFill>
+                <a:latin typeface="Courier New"/>
+                <a:ea typeface="Courier New"/>
+                <a:cs typeface="Courier New"/>
+                <a:sym typeface="Courier New"/>
+              </a:rPr>
+              <a:t>0.07370001077651978 ms</a:t>
+            </a:r>
+            <a:endParaRPr i="1">
+              <a:solidFill>
+                <a:schemeClr val="lt1"/>
+              </a:solidFill>
+            </a:endParaRPr>
+          </a:p>
+          <a:p>
+            <a:pPr indent="0" lvl="0" marL="0" rtl="0" algn="l">
+              <a:lnSpc>
+                <a:spcPct val="135714"/>
+              </a:lnSpc>
+              <a:spcBef>
+                <a:spcPts val="0"/>
+              </a:spcBef>
+              <a:spcAft>
+                <a:spcPts val="0"/>
+              </a:spcAft>
+              <a:buNone/>
+            </a:pPr>
+            <a:r>
+              <a:t/>
+            </a:r>
+            <a:endParaRPr i="1" sz="1350">
+              <a:solidFill>
+                <a:schemeClr val="lt1"/>
+              </a:solidFill>
+              <a:latin typeface="Courier New"/>
+              <a:ea typeface="Courier New"/>
+              <a:cs typeface="Courier New"/>
+              <a:sym typeface="Courier New"/>
+            </a:endParaRPr>
+          </a:p>
+          <a:p>
+            <a:pPr indent="0" lvl="0" marL="0" rtl="0" algn="l">
+              <a:lnSpc>
+                <a:spcPct val="115000"/>
+              </a:lnSpc>
+              <a:spcBef>
+                <a:spcPts val="0"/>
+              </a:spcBef>
+              <a:spcAft>
+                <a:spcPts val="0"/>
+              </a:spcAft>
+              <a:buNone/>
+            </a:pPr>
+            <a:r>
+              <a:rPr i="1" lang="en">
+                <a:solidFill>
+                  <a:schemeClr val="lt1"/>
+                </a:solidFill>
+              </a:rPr>
+              <a:t>Para el valor &lt;9.999.999&gt;:</a:t>
+            </a:r>
+            <a:endParaRPr i="1">
+              <a:solidFill>
+                <a:schemeClr val="lt1"/>
+              </a:solidFill>
+            </a:endParaRPr>
+          </a:p>
+          <a:p>
+            <a:pPr indent="0" lvl="0" marL="0" rtl="0" algn="l">
+              <a:lnSpc>
+                <a:spcPct val="115000"/>
+              </a:lnSpc>
+              <a:spcBef>
+                <a:spcPts val="0"/>
+              </a:spcBef>
+              <a:spcAft>
+                <a:spcPts val="0"/>
+              </a:spcAft>
+              <a:buNone/>
+            </a:pPr>
+            <a:r>
+              <a:rPr i="1" lang="en">
+                <a:solidFill>
+                  <a:schemeClr val="lt1"/>
+                </a:solidFill>
+              </a:rPr>
+              <a:t>Tiempo de ejecución Prolog: 71.20349407196045 ms</a:t>
+            </a:r>
+            <a:endParaRPr i="1">
+              <a:solidFill>
+                <a:schemeClr val="lt1"/>
+              </a:solidFill>
+            </a:endParaRPr>
+          </a:p>
+          <a:p>
+            <a:pPr indent="0" lvl="0" marL="0" rtl="0" algn="l">
+              <a:lnSpc>
+                <a:spcPct val="115000"/>
+              </a:lnSpc>
+              <a:spcBef>
+                <a:spcPts val="0"/>
+              </a:spcBef>
+              <a:spcAft>
+                <a:spcPts val="0"/>
+              </a:spcAft>
+              <a:buNone/>
+            </a:pPr>
+            <a:r>
+              <a:rPr i="1" lang="en">
+                <a:solidFill>
+                  <a:schemeClr val="lt1"/>
+                </a:solidFill>
+              </a:rPr>
+              <a:t>Tiempo de ejecución Javascript:  </a:t>
+            </a:r>
+            <a:r>
+              <a:rPr i="1" lang="en" sz="1350">
+                <a:solidFill>
+                  <a:schemeClr val="lt1"/>
+                </a:solidFill>
+                <a:latin typeface="Courier New"/>
+                <a:ea typeface="Courier New"/>
+                <a:cs typeface="Courier New"/>
+                <a:sym typeface="Courier New"/>
+              </a:rPr>
+              <a:t>0.07719999551773071 ms</a:t>
+            </a:r>
+            <a:endParaRPr i="1">
+              <a:solidFill>
+                <a:schemeClr val="lt1"/>
+              </a:solidFill>
+            </a:endParaRPr>
+          </a:p>
+          <a:p>
+            <a:pPr indent="0" lvl="0" marL="0" rtl="0" algn="l">
+              <a:lnSpc>
+                <a:spcPct val="115000"/>
+              </a:lnSpc>
+              <a:spcBef>
+                <a:spcPts val="0"/>
+              </a:spcBef>
+              <a:spcAft>
+                <a:spcPts val="0"/>
+              </a:spcAft>
+              <a:buNone/>
+            </a:pPr>
+            <a:r>
+              <a:t/>
+            </a:r>
+            <a:endParaRPr i="1">
+              <a:solidFill>
+                <a:schemeClr val="lt1"/>
+              </a:solidFill>
+            </a:endParaRPr>
+          </a:p>
+          <a:p>
+            <a:pPr indent="0" lvl="0" marL="0" rtl="0" algn="l">
+              <a:lnSpc>
+                <a:spcPct val="115000"/>
+              </a:lnSpc>
+              <a:spcBef>
+                <a:spcPts val="0"/>
+              </a:spcBef>
+              <a:spcAft>
+                <a:spcPts val="0"/>
+              </a:spcAft>
+              <a:buNone/>
+            </a:pPr>
+            <a:r>
+              <a:rPr i="1" lang="en">
+                <a:solidFill>
+                  <a:schemeClr val="lt1"/>
+                </a:solidFill>
+              </a:rPr>
+              <a:t>Para el valor &lt;5.000.000&gt;:</a:t>
+            </a:r>
+            <a:endParaRPr i="1">
+              <a:solidFill>
+                <a:schemeClr val="lt1"/>
+              </a:solidFill>
+            </a:endParaRPr>
+          </a:p>
+          <a:p>
+            <a:pPr indent="0" lvl="0" marL="0" rtl="0" algn="l">
+              <a:lnSpc>
+                <a:spcPct val="115000"/>
+              </a:lnSpc>
+              <a:spcBef>
+                <a:spcPts val="0"/>
+              </a:spcBef>
+              <a:spcAft>
+                <a:spcPts val="0"/>
+              </a:spcAft>
+              <a:buNone/>
+            </a:pPr>
+            <a:r>
+              <a:rPr i="1" lang="en">
+                <a:solidFill>
+                  <a:schemeClr val="lt1"/>
+                </a:solidFill>
+              </a:rPr>
+              <a:t>Tiempo de ejecución Prolog: 1.557612419128418 ms</a:t>
+            </a:r>
+            <a:endParaRPr i="1">
+              <a:solidFill>
+                <a:schemeClr val="lt1"/>
+              </a:solidFill>
+            </a:endParaRPr>
+          </a:p>
+          <a:p>
+            <a:pPr indent="0" lvl="0" marL="0" rtl="0" algn="l">
+              <a:lnSpc>
+                <a:spcPct val="115000"/>
+              </a:lnSpc>
+              <a:spcBef>
+                <a:spcPts val="0"/>
+              </a:spcBef>
+              <a:spcAft>
+                <a:spcPts val="0"/>
+              </a:spcAft>
+              <a:buNone/>
+            </a:pPr>
+            <a:r>
+              <a:rPr i="1" lang="en">
+                <a:solidFill>
+                  <a:schemeClr val="lt1"/>
+                </a:solidFill>
+              </a:rPr>
+              <a:t>Tiempo de ejecución Javascript: </a:t>
+            </a:r>
+            <a:r>
+              <a:rPr i="1" lang="en" sz="1350">
+                <a:solidFill>
+                  <a:schemeClr val="lt1"/>
+                </a:solidFill>
+                <a:latin typeface="Courier New"/>
+                <a:ea typeface="Courier New"/>
+                <a:cs typeface="Courier New"/>
+                <a:sym typeface="Courier New"/>
+              </a:rPr>
+              <a:t>0.07559999823570251 ms</a:t>
+            </a:r>
+            <a:endParaRPr i="1" sz="1350">
+              <a:solidFill>
+                <a:schemeClr val="lt1"/>
+              </a:solidFill>
+              <a:latin typeface="Courier New"/>
+              <a:ea typeface="Courier New"/>
+              <a:cs typeface="Courier New"/>
+              <a:sym typeface="Courier New"/>
+            </a:endParaRPr>
+          </a:p>
+        </p:txBody>
+      </p:sp>
+      <p:sp>
+        <p:nvSpPr>
+          <p:cNvPr id="201" name="Google Shape;201;p22"/>
+          <p:cNvSpPr txBox="1"/>
+          <p:nvPr/>
+        </p:nvSpPr>
+        <p:spPr>
+          <a:xfrm>
+            <a:off x="5033850" y="470200"/>
+            <a:ext cx="3147000" cy="646500"/>
+          </a:xfrm>
+          <a:prstGeom prst="rect">
+            <a:avLst/>
+          </a:prstGeom>
+          <a:noFill/>
+          <a:ln>
+            <a:noFill/>
+          </a:ln>
+        </p:spPr>
+        <p:txBody>
+          <a:bodyPr anchorCtr="0" anchor="t" bIns="91425" lIns="91425" spcFirstLastPara="1" rIns="91425" wrap="square" tIns="91425">
+            <a:spAutoFit/>
+          </a:bodyPr>
+          <a:lstStyle/>
+          <a:p>
+            <a:pPr indent="0" lvl="0" marL="0" rtl="0" algn="r">
+              <a:spcBef>
+                <a:spcPts val="0"/>
+              </a:spcBef>
+              <a:spcAft>
+                <a:spcPts val="0"/>
+              </a:spcAft>
+              <a:buNone/>
+            </a:pPr>
+            <a:r>
+              <a:rPr b="1" lang="en" sz="3000">
+                <a:solidFill>
+                  <a:schemeClr val="lt1"/>
+                </a:solidFill>
+                <a:latin typeface="Lato"/>
+                <a:ea typeface="Lato"/>
+                <a:cs typeface="Lato"/>
+                <a:sym typeface="Lato"/>
+              </a:rPr>
+              <a:t>Resultados</a:t>
+            </a:r>
+            <a:endParaRPr b="1" sz="3000">
+              <a:solidFill>
+                <a:schemeClr val="lt1"/>
+              </a:solidFill>
+              <a:latin typeface="Lato"/>
+              <a:ea typeface="Lato"/>
+              <a:cs typeface="Lato"/>
+              <a:sym typeface="Lato"/>
+            </a:endParaRPr>
+          </a:p>
+        </p:txBody>
+      </p:sp>
+    </p:spTree>
+  </p:cSld>
+  <p:clrMapOvr>
+    <a:masterClrMapping/>
+  </p:clrMapOvr>
+</p:sld>
+</file>
+
+<file path=ppt/slides/slide11.xml><?xml version="1.0" encoding="utf-8"?>
+<p:sld xmlns:a="http://schemas.openxmlformats.org/drawingml/2006/main" xmlns:r="http://schemas.openxmlformats.org/officeDocument/2006/relationships" xmlns:mc="http://schemas.openxmlformats.org/markup-compatibility/2006" xmlns:mv="urn:schemas-microsoft-com:mac:vml" xmlns:p="http://schemas.openxmlformats.org/presentationml/2006/main" xmlns:c="http://schemas.openxmlformats.org/drawingml/2006/chart" xmlns:dgm="http://schemas.openxmlformats.org/drawingml/2006/diagram" xmlns:o="urn:schemas-microsoft-com:office:office" xmlns:v="urn:schemas-microsoft-com:vml" xmlns:pvml="urn:schemas-microsoft-com:office:powerpoint" xmlns:com="http://schemas.openxmlformats.org/drawingml/2006/compatibility" xmlns:p14="http://schemas.microsoft.com/office/powerpoint/2010/main" xmlns:p15="http://schemas.microsoft.com/office/powerpoint/2012/main" xmlns:ahyp="http://schemas.microsoft.com/office/drawing/2018/hyperlinkcolor">
+  <p:cSld>
+    <p:spTree>
+      <p:nvGrpSpPr>
+        <p:cNvPr id="205" name="Shape 205"/>
+        <p:cNvGrpSpPr/>
+        <p:nvPr/>
+      </p:nvGrpSpPr>
+      <p:grpSpPr>
+        <a:xfrm>
+          <a:off x="0" y="0"/>
+          <a:ext cx="0" cy="0"/>
+          <a:chOff x="0" y="0"/>
+          <a:chExt cx="0" cy="0"/>
+        </a:xfrm>
+      </p:grpSpPr>
+      <p:sp>
+        <p:nvSpPr>
+          <p:cNvPr id="206" name="Google Shape;206;p23"/>
+          <p:cNvSpPr txBox="1"/>
           <p:nvPr>
             <p:ph type="title"/>
           </p:nvPr>
@@ -10782,7 +11422,7 @@
       </p:sp>
       <p:sp>
         <p:nvSpPr>
-          <p:cNvPr id="201" name="Google Shape;201;p22"/>
+          <p:cNvPr id="207" name="Google Shape;207;p23"/>
           <p:cNvSpPr txBox="1"/>
           <p:nvPr/>
         </p:nvSpPr>
@@ -10843,7 +11483,7 @@
       </p:sp>
       <p:sp>
         <p:nvSpPr>
-          <p:cNvPr id="202" name="Google Shape;202;p22"/>
+          <p:cNvPr id="208" name="Google Shape;208;p23"/>
           <p:cNvSpPr/>
           <p:nvPr/>
         </p:nvSpPr>
@@ -10907,12 +11547,12 @@
 </p:sld>
 </file>
 
-<file path=ppt/slides/slide11.xml><?xml version="1.0" encoding="utf-8"?>
+<file path=ppt/slides/slide12.xml><?xml version="1.0" encoding="utf-8"?>
 <p:sld xmlns:a="http://schemas.openxmlformats.org/drawingml/2006/main" xmlns:r="http://schemas.openxmlformats.org/officeDocument/2006/relationships" xmlns:mc="http://schemas.openxmlformats.org/markup-compatibility/2006" xmlns:mv="urn:schemas-microsoft-com:mac:vml" xmlns:p="http://schemas.openxmlformats.org/presentationml/2006/main" xmlns:c="http://schemas.openxmlformats.org/drawingml/2006/chart" xmlns:dgm="http://schemas.openxmlformats.org/drawingml/2006/diagram" xmlns:o="urn:schemas-microsoft-com:office:office" xmlns:v="urn:schemas-microsoft-com:vml" xmlns:pvml="urn:schemas-microsoft-com:office:powerpoint" xmlns:com="http://schemas.openxmlformats.org/drawingml/2006/compatibility" xmlns:p14="http://schemas.microsoft.com/office/powerpoint/2010/main" xmlns:p15="http://schemas.microsoft.com/office/powerpoint/2012/main" xmlns:ahyp="http://schemas.microsoft.com/office/drawing/2018/hyperlinkcolor">
   <p:cSld>
     <p:spTree>
       <p:nvGrpSpPr>
-        <p:cNvPr id="206" name="Shape 206"/>
+        <p:cNvPr id="212" name="Shape 212"/>
         <p:cNvGrpSpPr/>
         <p:nvPr/>
       </p:nvGrpSpPr>
@@ -10926,7 +11566,7 @@
       </p:grpSpPr>
       <p:sp>
         <p:nvSpPr>
-          <p:cNvPr id="207" name="Google Shape;207;p23"/>
+          <p:cNvPr id="213" name="Google Shape;213;p24"/>
           <p:cNvSpPr txBox="1"/>
           <p:nvPr/>
         </p:nvSpPr>
@@ -12955,7 +13595,7 @@
       </p:sp>
       <p:sp>
         <p:nvSpPr>
-          <p:cNvPr id="208" name="Google Shape;208;p23"/>
+          <p:cNvPr id="214" name="Google Shape;214;p24"/>
           <p:cNvSpPr txBox="1"/>
           <p:nvPr/>
         </p:nvSpPr>
@@ -13013,7 +13653,7 @@
       </p:sp>
       <p:sp>
         <p:nvSpPr>
-          <p:cNvPr id="209" name="Google Shape;209;p23"/>
+          <p:cNvPr id="215" name="Google Shape;215;p24"/>
           <p:cNvSpPr txBox="1"/>
           <p:nvPr/>
         </p:nvSpPr>
@@ -14150,12 +14790,12 @@
 </p:sld>
 </file>
 
-<file path=ppt/slides/slide12.xml><?xml version="1.0" encoding="utf-8"?>
+<file path=ppt/slides/slide13.xml><?xml version="1.0" encoding="utf-8"?>
 <p:sld xmlns:a="http://schemas.openxmlformats.org/drawingml/2006/main" xmlns:r="http://schemas.openxmlformats.org/officeDocument/2006/relationships" xmlns:mc="http://schemas.openxmlformats.org/markup-compatibility/2006" xmlns:mv="urn:schemas-microsoft-com:mac:vml" xmlns:p="http://schemas.openxmlformats.org/presentationml/2006/main" xmlns:c="http://schemas.openxmlformats.org/drawingml/2006/chart" xmlns:dgm="http://schemas.openxmlformats.org/drawingml/2006/diagram" xmlns:o="urn:schemas-microsoft-com:office:office" xmlns:v="urn:schemas-microsoft-com:vml" xmlns:pvml="urn:schemas-microsoft-com:office:powerpoint" xmlns:com="http://schemas.openxmlformats.org/drawingml/2006/compatibility" xmlns:p14="http://schemas.microsoft.com/office/powerpoint/2010/main" xmlns:p15="http://schemas.microsoft.com/office/powerpoint/2012/main" xmlns:ahyp="http://schemas.microsoft.com/office/drawing/2018/hyperlinkcolor">
   <p:cSld>
     <p:spTree>
       <p:nvGrpSpPr>
-        <p:cNvPr id="213" name="Shape 213"/>
+        <p:cNvPr id="219" name="Shape 219"/>
         <p:cNvGrpSpPr/>
         <p:nvPr/>
       </p:nvGrpSpPr>
@@ -14169,7 +14809,7 @@
       </p:grpSpPr>
       <p:sp>
         <p:nvSpPr>
-          <p:cNvPr id="214" name="Google Shape;214;p24"/>
+          <p:cNvPr id="220" name="Google Shape;220;p25"/>
           <p:cNvSpPr txBox="1"/>
           <p:nvPr/>
         </p:nvSpPr>
@@ -16779,7 +17419,7 @@
       </p:sp>
       <p:sp>
         <p:nvSpPr>
-          <p:cNvPr id="215" name="Google Shape;215;p24"/>
+          <p:cNvPr id="221" name="Google Shape;221;p25"/>
           <p:cNvSpPr txBox="1"/>
           <p:nvPr/>
         </p:nvSpPr>
@@ -16837,7 +17477,7 @@
       </p:sp>
       <p:sp>
         <p:nvSpPr>
-          <p:cNvPr id="216" name="Google Shape;216;p24"/>
+          <p:cNvPr id="222" name="Google Shape;222;p25"/>
           <p:cNvSpPr txBox="1"/>
           <p:nvPr/>
         </p:nvSpPr>
@@ -18543,217 +19183,6 @@
               <a:t>);</a:t>
             </a:r>
             <a:endParaRPr>
-              <a:latin typeface="Lato"/>
-              <a:ea typeface="Lato"/>
-              <a:cs typeface="Lato"/>
-              <a:sym typeface="Lato"/>
-            </a:endParaRPr>
-          </a:p>
-        </p:txBody>
-      </p:sp>
-    </p:spTree>
-  </p:cSld>
-  <p:clrMapOvr>
-    <a:masterClrMapping/>
-  </p:clrMapOvr>
-</p:sld>
-</file>
-
-<file path=ppt/slides/slide13.xml><?xml version="1.0" encoding="utf-8"?>
-<p:sld xmlns:a="http://schemas.openxmlformats.org/drawingml/2006/main" xmlns:r="http://schemas.openxmlformats.org/officeDocument/2006/relationships" xmlns:mc="http://schemas.openxmlformats.org/markup-compatibility/2006" xmlns:mv="urn:schemas-microsoft-com:mac:vml" xmlns:p="http://schemas.openxmlformats.org/presentationml/2006/main" xmlns:c="http://schemas.openxmlformats.org/drawingml/2006/chart" xmlns:dgm="http://schemas.openxmlformats.org/drawingml/2006/diagram" xmlns:o="urn:schemas-microsoft-com:office:office" xmlns:v="urn:schemas-microsoft-com:vml" xmlns:pvml="urn:schemas-microsoft-com:office:powerpoint" xmlns:com="http://schemas.openxmlformats.org/drawingml/2006/compatibility" xmlns:p14="http://schemas.microsoft.com/office/powerpoint/2010/main" xmlns:p15="http://schemas.microsoft.com/office/powerpoint/2012/main" xmlns:ahyp="http://schemas.microsoft.com/office/drawing/2018/hyperlinkcolor">
-  <p:cSld>
-    <p:spTree>
-      <p:nvGrpSpPr>
-        <p:cNvPr id="220" name="Shape 220"/>
-        <p:cNvGrpSpPr/>
-        <p:nvPr/>
-      </p:nvGrpSpPr>
-      <p:grpSpPr>
-        <a:xfrm>
-          <a:off x="0" y="0"/>
-          <a:ext cx="0" cy="0"/>
-          <a:chOff x="0" y="0"/>
-          <a:chExt cx="0" cy="0"/>
-        </a:xfrm>
-      </p:grpSpPr>
-      <p:sp>
-        <p:nvSpPr>
-          <p:cNvPr id="221" name="Google Shape;221;p25"/>
-          <p:cNvSpPr txBox="1"/>
-          <p:nvPr>
-            <p:ph type="title"/>
-          </p:nvPr>
-        </p:nvSpPr>
-        <p:spPr>
-          <a:xfrm>
-            <a:off x="317300" y="241075"/>
-            <a:ext cx="4587000" cy="1148700"/>
-          </a:xfrm>
-          <a:prstGeom prst="rect">
-            <a:avLst/>
-          </a:prstGeom>
-        </p:spPr>
-        <p:txBody>
-          <a:bodyPr anchorCtr="0" anchor="ctr" bIns="91425" lIns="91425" spcFirstLastPara="1" rIns="91425" wrap="square" tIns="91425">
-            <a:normAutofit/>
-          </a:bodyPr>
-          <a:lstStyle/>
-          <a:p>
-            <a:pPr indent="0" lvl="0" marL="0" rtl="0" algn="l">
-              <a:spcBef>
-                <a:spcPts val="0"/>
-              </a:spcBef>
-              <a:spcAft>
-                <a:spcPts val="0"/>
-              </a:spcAft>
-              <a:buNone/>
-            </a:pPr>
-            <a:r>
-              <a:rPr lang="en" sz="5000"/>
-              <a:t>Conclusiones</a:t>
-            </a:r>
-            <a:endParaRPr sz="5000"/>
-          </a:p>
-        </p:txBody>
-      </p:sp>
-      <p:sp>
-        <p:nvSpPr>
-          <p:cNvPr id="222" name="Google Shape;222;p25"/>
-          <p:cNvSpPr txBox="1"/>
-          <p:nvPr/>
-        </p:nvSpPr>
-        <p:spPr>
-          <a:xfrm>
-            <a:off x="336800" y="1956075"/>
-            <a:ext cx="6994500" cy="2279400"/>
-          </a:xfrm>
-          <a:prstGeom prst="rect">
-            <a:avLst/>
-          </a:prstGeom>
-          <a:noFill/>
-          <a:ln>
-            <a:noFill/>
-          </a:ln>
-        </p:spPr>
-        <p:txBody>
-          <a:bodyPr anchorCtr="0" anchor="t" bIns="91425" lIns="91425" spcFirstLastPara="1" rIns="91425" wrap="square" tIns="91425">
-            <a:noAutofit/>
-          </a:bodyPr>
-          <a:lstStyle/>
-          <a:p>
-            <a:pPr indent="-387350" lvl="0" marL="457200" rtl="0" algn="l">
-              <a:spcBef>
-                <a:spcPts val="0"/>
-              </a:spcBef>
-              <a:spcAft>
-                <a:spcPts val="0"/>
-              </a:spcAft>
-              <a:buClr>
-                <a:schemeClr val="lt1"/>
-              </a:buClr>
-              <a:buSzPts val="2500"/>
-              <a:buFont typeface="Lato"/>
-              <a:buChar char="-"/>
-            </a:pPr>
-            <a:r>
-              <a:rPr lang="en" sz="2500">
-                <a:solidFill>
-                  <a:schemeClr val="lt1"/>
-                </a:solidFill>
-                <a:latin typeface="Lato"/>
-                <a:ea typeface="Lato"/>
-                <a:cs typeface="Lato"/>
-                <a:sym typeface="Lato"/>
-              </a:rPr>
-              <a:t>Compatibilidad con el Tipo de Problema</a:t>
-            </a:r>
-            <a:endParaRPr sz="2500">
-              <a:solidFill>
-                <a:schemeClr val="lt1"/>
-              </a:solidFill>
-              <a:latin typeface="Lato"/>
-              <a:ea typeface="Lato"/>
-              <a:cs typeface="Lato"/>
-              <a:sym typeface="Lato"/>
-            </a:endParaRPr>
-          </a:p>
-          <a:p>
-            <a:pPr indent="0" lvl="0" marL="457200" rtl="0" algn="l">
-              <a:spcBef>
-                <a:spcPts val="0"/>
-              </a:spcBef>
-              <a:spcAft>
-                <a:spcPts val="0"/>
-              </a:spcAft>
-              <a:buNone/>
-            </a:pPr>
-            <a:r>
-              <a:t/>
-            </a:r>
-            <a:endParaRPr sz="2500">
-              <a:solidFill>
-                <a:schemeClr val="lt1"/>
-              </a:solidFill>
-              <a:latin typeface="Lato"/>
-              <a:ea typeface="Lato"/>
-              <a:cs typeface="Lato"/>
-              <a:sym typeface="Lato"/>
-            </a:endParaRPr>
-          </a:p>
-          <a:p>
-            <a:pPr indent="0" lvl="0" marL="457200" rtl="0" algn="l">
-              <a:spcBef>
-                <a:spcPts val="0"/>
-              </a:spcBef>
-              <a:spcAft>
-                <a:spcPts val="0"/>
-              </a:spcAft>
-              <a:buNone/>
-            </a:pPr>
-            <a:r>
-              <a:t/>
-            </a:r>
-            <a:endParaRPr sz="2500">
-              <a:solidFill>
-                <a:schemeClr val="lt1"/>
-              </a:solidFill>
-              <a:latin typeface="Lato"/>
-              <a:ea typeface="Lato"/>
-              <a:cs typeface="Lato"/>
-              <a:sym typeface="Lato"/>
-            </a:endParaRPr>
-          </a:p>
-          <a:p>
-            <a:pPr indent="-387350" lvl="0" marL="457200" rtl="0" algn="l">
-              <a:spcBef>
-                <a:spcPts val="0"/>
-              </a:spcBef>
-              <a:spcAft>
-                <a:spcPts val="0"/>
-              </a:spcAft>
-              <a:buClr>
-                <a:schemeClr val="lt1"/>
-              </a:buClr>
-              <a:buSzPts val="2500"/>
-              <a:buFont typeface="Lato"/>
-              <a:buChar char="-"/>
-            </a:pPr>
-            <a:r>
-              <a:rPr lang="en" sz="2500">
-                <a:solidFill>
-                  <a:schemeClr val="lt1"/>
-                </a:solidFill>
-                <a:latin typeface="Lato"/>
-                <a:ea typeface="Lato"/>
-                <a:cs typeface="Lato"/>
-                <a:sym typeface="Lato"/>
-              </a:rPr>
-              <a:t>Complejidad y Claridad del Código</a:t>
-            </a:r>
-            <a:endParaRPr sz="2500">
-              <a:solidFill>
-                <a:schemeClr val="lt1"/>
-              </a:solidFill>
               <a:latin typeface="Lato"/>
               <a:ea typeface="Lato"/>
               <a:cs typeface="Lato"/>
@@ -18791,52 +19220,12 @@
         <p:nvSpPr>
           <p:cNvPr id="227" name="Google Shape;227;p26"/>
           <p:cNvSpPr txBox="1"/>
-          <p:nvPr>
-            <p:ph type="title"/>
-          </p:nvPr>
-        </p:nvSpPr>
-        <p:spPr>
-          <a:xfrm>
-            <a:off x="336800" y="338500"/>
-            <a:ext cx="4587000" cy="1148700"/>
-          </a:xfrm>
-          <a:prstGeom prst="rect">
-            <a:avLst/>
-          </a:prstGeom>
-        </p:spPr>
-        <p:txBody>
-          <a:bodyPr anchorCtr="0" anchor="ctr" bIns="91425" lIns="91425" spcFirstLastPara="1" rIns="91425" wrap="square" tIns="91425">
-            <a:normAutofit/>
-          </a:bodyPr>
-          <a:lstStyle/>
-          <a:p>
-            <a:pPr indent="0" lvl="0" marL="0" rtl="0" algn="l">
-              <a:spcBef>
-                <a:spcPts val="0"/>
-              </a:spcBef>
-              <a:spcAft>
-                <a:spcPts val="0"/>
-              </a:spcAft>
-              <a:buNone/>
-            </a:pPr>
-            <a:r>
-              <a:rPr lang="en" sz="3000"/>
-              <a:t>Preguntas para pensar</a:t>
-            </a:r>
-            <a:endParaRPr sz="3000"/>
-          </a:p>
-        </p:txBody>
-      </p:sp>
-      <p:sp>
-        <p:nvSpPr>
-          <p:cNvPr id="228" name="Google Shape;228;p26"/>
-          <p:cNvSpPr txBox="1"/>
           <p:nvPr/>
         </p:nvSpPr>
         <p:spPr>
           <a:xfrm>
-            <a:off x="336800" y="1487200"/>
-            <a:ext cx="6994500" cy="3469200"/>
+            <a:off x="570900" y="1120800"/>
+            <a:ext cx="8002200" cy="2901900"/>
           </a:xfrm>
           <a:prstGeom prst="rect">
             <a:avLst/>
@@ -18852,22 +19241,448 @@
           </a:bodyPr>
           <a:lstStyle/>
           <a:p>
-            <a:pPr indent="-342900" lvl="0" marL="457200" rtl="0" algn="l">
-              <a:spcBef>
-                <a:spcPts val="0"/>
-              </a:spcBef>
-              <a:spcAft>
-                <a:spcPts val="0"/>
-              </a:spcAft>
-              <a:buClr>
+            <a:pPr indent="0" lvl="0" marL="0" rtl="0" algn="l">
+              <a:lnSpc>
+                <a:spcPct val="115000"/>
+              </a:lnSpc>
+              <a:spcBef>
+                <a:spcPts val="0"/>
+              </a:spcBef>
+              <a:spcAft>
+                <a:spcPts val="0"/>
+              </a:spcAft>
+              <a:buNone/>
+            </a:pPr>
+            <a:r>
+              <a:rPr lang="en">
+                <a:solidFill>
+                  <a:schemeClr val="lt1"/>
+                </a:solidFill>
+              </a:rPr>
+              <a:t>Para la colección </a:t>
+            </a:r>
+            <a:r>
+              <a:rPr i="1" lang="en">
+                <a:solidFill>
+                  <a:schemeClr val="lt1"/>
+                </a:solidFill>
+                <a:latin typeface="Courier New"/>
+                <a:ea typeface="Courier New"/>
+                <a:cs typeface="Courier New"/>
+                <a:sym typeface="Courier New"/>
+              </a:rPr>
+              <a:t>[4, 2, 8, 5, 1, 6, 7, 3]</a:t>
+            </a:r>
+            <a:r>
+              <a:rPr lang="en">
+                <a:solidFill>
+                  <a:schemeClr val="lt1"/>
+                </a:solidFill>
+              </a:rPr>
+              <a:t>:</a:t>
+            </a:r>
+            <a:endParaRPr>
+              <a:solidFill>
                 <a:schemeClr val="lt1"/>
-              </a:buClr>
-              <a:buSzPts val="1800"/>
-              <a:buFont typeface="Lato"/>
-              <a:buChar char="-"/>
+              </a:solidFill>
+            </a:endParaRPr>
+          </a:p>
+          <a:p>
+            <a:pPr indent="0" lvl="0" marL="0" rtl="0" algn="l">
+              <a:lnSpc>
+                <a:spcPct val="115000"/>
+              </a:lnSpc>
+              <a:spcBef>
+                <a:spcPts val="0"/>
+              </a:spcBef>
+              <a:spcAft>
+                <a:spcPts val="0"/>
+              </a:spcAft>
+              <a:buNone/>
             </a:pPr>
             <a:r>
-              <a:rPr lang="en" sz="1800">
+              <a:rPr lang="en">
+                <a:solidFill>
+                  <a:schemeClr val="lt1"/>
+                </a:solidFill>
+              </a:rPr>
+              <a:t>Tiempo de ejecución Prolog: 0.0000209808349609375 ms</a:t>
+            </a:r>
+            <a:endParaRPr>
+              <a:solidFill>
+                <a:schemeClr val="lt1"/>
+              </a:solidFill>
+            </a:endParaRPr>
+          </a:p>
+          <a:p>
+            <a:pPr indent="0" lvl="0" marL="0" rtl="0" algn="l">
+              <a:lnSpc>
+                <a:spcPct val="115000"/>
+              </a:lnSpc>
+              <a:spcBef>
+                <a:spcPts val="0"/>
+              </a:spcBef>
+              <a:spcAft>
+                <a:spcPts val="0"/>
+              </a:spcAft>
+              <a:buNone/>
+            </a:pPr>
+            <a:r>
+              <a:rPr lang="en">
+                <a:solidFill>
+                  <a:schemeClr val="lt1"/>
+                </a:solidFill>
+              </a:rPr>
+              <a:t>Tiempo de ejecución Javascript: </a:t>
+            </a:r>
+            <a:r>
+              <a:rPr lang="en">
+                <a:solidFill>
+                  <a:schemeClr val="lt1"/>
+                </a:solidFill>
+                <a:latin typeface="Courier New"/>
+                <a:ea typeface="Courier New"/>
+                <a:cs typeface="Courier New"/>
+                <a:sym typeface="Courier New"/>
+              </a:rPr>
+              <a:t>0.19429993629455566 ms</a:t>
+            </a:r>
+            <a:endParaRPr>
+              <a:solidFill>
+                <a:schemeClr val="lt1"/>
+              </a:solidFill>
+            </a:endParaRPr>
+          </a:p>
+          <a:p>
+            <a:pPr indent="0" lvl="0" marL="0" rtl="0" algn="l">
+              <a:lnSpc>
+                <a:spcPct val="115000"/>
+              </a:lnSpc>
+              <a:spcBef>
+                <a:spcPts val="0"/>
+              </a:spcBef>
+              <a:spcAft>
+                <a:spcPts val="0"/>
+              </a:spcAft>
+              <a:buNone/>
+            </a:pPr>
+            <a:r>
+              <a:t/>
+            </a:r>
+            <a:endParaRPr>
+              <a:solidFill>
+                <a:schemeClr val="lt1"/>
+              </a:solidFill>
+            </a:endParaRPr>
+          </a:p>
+          <a:p>
+            <a:pPr indent="0" lvl="0" marL="0" rtl="0" algn="l">
+              <a:lnSpc>
+                <a:spcPct val="115000"/>
+              </a:lnSpc>
+              <a:spcBef>
+                <a:spcPts val="0"/>
+              </a:spcBef>
+              <a:spcAft>
+                <a:spcPts val="0"/>
+              </a:spcAft>
+              <a:buNone/>
+            </a:pPr>
+            <a:r>
+              <a:t/>
+            </a:r>
+            <a:endParaRPr>
+              <a:solidFill>
+                <a:schemeClr val="lt1"/>
+              </a:solidFill>
+            </a:endParaRPr>
+          </a:p>
+          <a:p>
+            <a:pPr indent="0" lvl="0" marL="0" rtl="0" algn="l">
+              <a:lnSpc>
+                <a:spcPct val="115000"/>
+              </a:lnSpc>
+              <a:spcBef>
+                <a:spcPts val="0"/>
+              </a:spcBef>
+              <a:spcAft>
+                <a:spcPts val="0"/>
+              </a:spcAft>
+              <a:buNone/>
+            </a:pPr>
+            <a:r>
+              <a:rPr lang="en">
+                <a:solidFill>
+                  <a:schemeClr val="lt1"/>
+                </a:solidFill>
+              </a:rPr>
+              <a:t>Para la colección </a:t>
+            </a:r>
+            <a:r>
+              <a:rPr i="1" lang="en">
+                <a:solidFill>
+                  <a:schemeClr val="lt1"/>
+                </a:solidFill>
+                <a:latin typeface="Courier New"/>
+                <a:ea typeface="Courier New"/>
+                <a:cs typeface="Courier New"/>
+                <a:sym typeface="Courier New"/>
+              </a:rPr>
+              <a:t>[4, 2, 8, 5, 1, 6, 7, 3, 4, 2, 8, 5, 1, 6, 7, 3]</a:t>
+            </a:r>
+            <a:r>
+              <a:rPr lang="en">
+                <a:solidFill>
+                  <a:schemeClr val="lt1"/>
+                </a:solidFill>
+              </a:rPr>
+              <a:t>:</a:t>
+            </a:r>
+            <a:endParaRPr>
+              <a:solidFill>
+                <a:schemeClr val="lt1"/>
+              </a:solidFill>
+            </a:endParaRPr>
+          </a:p>
+          <a:p>
+            <a:pPr indent="0" lvl="0" marL="0" rtl="0" algn="l">
+              <a:lnSpc>
+                <a:spcPct val="115000"/>
+              </a:lnSpc>
+              <a:spcBef>
+                <a:spcPts val="0"/>
+              </a:spcBef>
+              <a:spcAft>
+                <a:spcPts val="0"/>
+              </a:spcAft>
+              <a:buNone/>
+            </a:pPr>
+            <a:r>
+              <a:rPr lang="en">
+                <a:solidFill>
+                  <a:schemeClr val="lt1"/>
+                </a:solidFill>
+              </a:rPr>
+              <a:t>Tiempo de ejecución Prolog: 0.11801719665527344 ms</a:t>
+            </a:r>
+            <a:endParaRPr>
+              <a:solidFill>
+                <a:schemeClr val="lt1"/>
+              </a:solidFill>
+            </a:endParaRPr>
+          </a:p>
+          <a:p>
+            <a:pPr indent="0" lvl="0" marL="0" rtl="0" algn="l">
+              <a:lnSpc>
+                <a:spcPct val="115000"/>
+              </a:lnSpc>
+              <a:spcBef>
+                <a:spcPts val="0"/>
+              </a:spcBef>
+              <a:spcAft>
+                <a:spcPts val="0"/>
+              </a:spcAft>
+              <a:buNone/>
+            </a:pPr>
+            <a:r>
+              <a:rPr lang="en">
+                <a:solidFill>
+                  <a:schemeClr val="lt1"/>
+                </a:solidFill>
+              </a:rPr>
+              <a:t>Tiempo de ejecución Javascript:  </a:t>
+            </a:r>
+            <a:r>
+              <a:rPr lang="en">
+                <a:solidFill>
+                  <a:schemeClr val="lt1"/>
+                </a:solidFill>
+                <a:latin typeface="Courier New"/>
+                <a:ea typeface="Courier New"/>
+                <a:cs typeface="Courier New"/>
+                <a:sym typeface="Courier New"/>
+              </a:rPr>
+              <a:t>0.19559991359710693 ms</a:t>
+            </a:r>
+            <a:endParaRPr i="1">
+              <a:solidFill>
+                <a:schemeClr val="lt1"/>
+              </a:solidFill>
+            </a:endParaRPr>
+          </a:p>
+          <a:p>
+            <a:pPr indent="0" lvl="0" marL="0" rtl="0" algn="l">
+              <a:lnSpc>
+                <a:spcPct val="115000"/>
+              </a:lnSpc>
+              <a:spcBef>
+                <a:spcPts val="0"/>
+              </a:spcBef>
+              <a:spcAft>
+                <a:spcPts val="0"/>
+              </a:spcAft>
+              <a:buNone/>
+            </a:pPr>
+            <a:r>
+              <a:t/>
+            </a:r>
+            <a:endParaRPr i="1">
+              <a:solidFill>
+                <a:schemeClr val="lt1"/>
+              </a:solidFill>
+            </a:endParaRPr>
+          </a:p>
+          <a:p>
+            <a:pPr indent="0" lvl="0" marL="0" rtl="0" algn="l">
+              <a:lnSpc>
+                <a:spcPct val="115000"/>
+              </a:lnSpc>
+              <a:spcBef>
+                <a:spcPts val="0"/>
+              </a:spcBef>
+              <a:spcAft>
+                <a:spcPts val="0"/>
+              </a:spcAft>
+              <a:buNone/>
+            </a:pPr>
+            <a:r>
+              <a:rPr lang="en">
+                <a:solidFill>
+                  <a:schemeClr val="lt1"/>
+                </a:solidFill>
+              </a:rPr>
+              <a:t>Para la colección </a:t>
+            </a:r>
+            <a:r>
+              <a:rPr i="1" lang="en">
+                <a:solidFill>
+                  <a:schemeClr val="lt1"/>
+                </a:solidFill>
+                <a:latin typeface="Courier New"/>
+                <a:ea typeface="Courier New"/>
+                <a:cs typeface="Courier New"/>
+                <a:sym typeface="Courier New"/>
+              </a:rPr>
+              <a:t>[4, 2, 8, 5, 1, 6, 7, 3, 4, 2, 8, 5, 1, 6, 7, 3, 4, 2, 8, 5, 1, 6, 7, 3]</a:t>
+            </a:r>
+            <a:r>
+              <a:rPr lang="en">
+                <a:solidFill>
+                  <a:schemeClr val="lt1"/>
+                </a:solidFill>
+              </a:rPr>
+              <a:t>:</a:t>
+            </a:r>
+            <a:endParaRPr>
+              <a:solidFill>
+                <a:schemeClr val="lt1"/>
+              </a:solidFill>
+            </a:endParaRPr>
+          </a:p>
+          <a:p>
+            <a:pPr indent="0" lvl="0" marL="0" rtl="0" algn="l">
+              <a:lnSpc>
+                <a:spcPct val="115000"/>
+              </a:lnSpc>
+              <a:spcBef>
+                <a:spcPts val="0"/>
+              </a:spcBef>
+              <a:spcAft>
+                <a:spcPts val="0"/>
+              </a:spcAft>
+              <a:buNone/>
+            </a:pPr>
+            <a:r>
+              <a:rPr lang="en">
+                <a:solidFill>
+                  <a:schemeClr val="lt1"/>
+                </a:solidFill>
+              </a:rPr>
+              <a:t>Tiempo de ejecución Prolog: 0.2219676971435547 ms</a:t>
+            </a:r>
+            <a:endParaRPr>
+              <a:solidFill>
+                <a:schemeClr val="lt1"/>
+              </a:solidFill>
+            </a:endParaRPr>
+          </a:p>
+          <a:p>
+            <a:pPr indent="0" lvl="0" marL="0" rtl="0" algn="l">
+              <a:lnSpc>
+                <a:spcPct val="115000"/>
+              </a:lnSpc>
+              <a:spcBef>
+                <a:spcPts val="0"/>
+              </a:spcBef>
+              <a:spcAft>
+                <a:spcPts val="0"/>
+              </a:spcAft>
+              <a:buNone/>
+            </a:pPr>
+            <a:r>
+              <a:rPr lang="en">
+                <a:solidFill>
+                  <a:schemeClr val="lt1"/>
+                </a:solidFill>
+              </a:rPr>
+              <a:t>Tiempo de ejecución Javascript: </a:t>
+            </a:r>
+            <a:r>
+              <a:rPr lang="en">
+                <a:solidFill>
+                  <a:schemeClr val="lt1"/>
+                </a:solidFill>
+                <a:latin typeface="Courier New"/>
+                <a:ea typeface="Courier New"/>
+                <a:cs typeface="Courier New"/>
+                <a:sym typeface="Courier New"/>
+              </a:rPr>
+              <a:t>0.21860003471374512 ms</a:t>
+            </a:r>
+            <a:endParaRPr i="1">
+              <a:solidFill>
+                <a:schemeClr val="lt1"/>
+              </a:solidFill>
+            </a:endParaRPr>
+          </a:p>
+        </p:txBody>
+      </p:sp>
+      <p:sp>
+        <p:nvSpPr>
+          <p:cNvPr id="228" name="Google Shape;228;p26"/>
+          <p:cNvSpPr txBox="1"/>
+          <p:nvPr/>
+        </p:nvSpPr>
+        <p:spPr>
+          <a:xfrm>
+            <a:off x="5033850" y="470200"/>
+            <a:ext cx="3147000" cy="646500"/>
+          </a:xfrm>
+          <a:prstGeom prst="rect">
+            <a:avLst/>
+          </a:prstGeom>
+          <a:noFill/>
+          <a:ln>
+            <a:noFill/>
+          </a:ln>
+        </p:spPr>
+        <p:txBody>
+          <a:bodyPr anchorCtr="0" anchor="t" bIns="91425" lIns="91425" spcFirstLastPara="1" rIns="91425" wrap="square" tIns="91425">
+            <a:spAutoFit/>
+          </a:bodyPr>
+          <a:lstStyle/>
+          <a:p>
+            <a:pPr indent="0" lvl="0" marL="0" rtl="0" algn="r">
+              <a:spcBef>
+                <a:spcPts val="0"/>
+              </a:spcBef>
+              <a:spcAft>
+                <a:spcPts val="0"/>
+              </a:spcAft>
+              <a:buNone/>
+            </a:pPr>
+            <a:r>
+              <a:rPr b="1" lang="en" sz="3000">
                 <a:solidFill>
                   <a:schemeClr val="lt1"/>
                 </a:solidFill>
@@ -18876,120 +19691,9 @@
                 <a:cs typeface="Lato"/>
                 <a:sym typeface="Lato"/>
               </a:rPr>
-              <a:t>¿Cuáles son las ventajas y desventajas de la evaluación perezosa en Prolog y cómo se compara  con la evaluación más inmediata en JavaScript?</a:t>
-            </a:r>
-            <a:endParaRPr sz="1800">
-              <a:solidFill>
-                <a:schemeClr val="lt1"/>
-              </a:solidFill>
-              <a:latin typeface="Lato"/>
-              <a:ea typeface="Lato"/>
-              <a:cs typeface="Lato"/>
-              <a:sym typeface="Lato"/>
-            </a:endParaRPr>
-          </a:p>
-          <a:p>
-            <a:pPr indent="-342900" lvl="0" marL="457200" rtl="0" algn="l">
-              <a:spcBef>
-                <a:spcPts val="0"/>
-              </a:spcBef>
-              <a:spcAft>
-                <a:spcPts val="0"/>
-              </a:spcAft>
-              <a:buClr>
-                <a:schemeClr val="lt1"/>
-              </a:buClr>
-              <a:buSzPts val="1800"/>
-              <a:buFont typeface="Lato"/>
-              <a:buChar char="-"/>
-            </a:pPr>
-            <a:r>
-              <a:rPr lang="en" sz="1800">
-                <a:solidFill>
-                  <a:schemeClr val="lt1"/>
-                </a:solidFill>
-                <a:latin typeface="Lato"/>
-                <a:ea typeface="Lato"/>
-                <a:cs typeface="Lato"/>
-                <a:sym typeface="Lato"/>
-              </a:rPr>
-              <a:t>¿Cómo influyen las diferencias en las optimizaciones internas y las estrategias de administración de memoria en el rendimiento de los algoritmos en ambos lenguajes?</a:t>
-            </a:r>
-            <a:endParaRPr sz="1800">
-              <a:solidFill>
-                <a:schemeClr val="lt1"/>
-              </a:solidFill>
-              <a:latin typeface="Lato"/>
-              <a:ea typeface="Lato"/>
-              <a:cs typeface="Lato"/>
-              <a:sym typeface="Lato"/>
-            </a:endParaRPr>
-          </a:p>
-          <a:p>
-            <a:pPr indent="-342900" lvl="0" marL="457200" rtl="0" algn="l">
-              <a:spcBef>
-                <a:spcPts val="0"/>
-              </a:spcBef>
-              <a:spcAft>
-                <a:spcPts val="0"/>
-              </a:spcAft>
-              <a:buClr>
-                <a:schemeClr val="lt1"/>
-              </a:buClr>
-              <a:buSzPts val="1800"/>
-              <a:buFont typeface="Lato"/>
-              <a:buChar char="-"/>
-            </a:pPr>
-            <a:r>
-              <a:rPr lang="en" sz="1800">
-                <a:solidFill>
-                  <a:schemeClr val="lt1"/>
-                </a:solidFill>
-                <a:latin typeface="Lato"/>
-                <a:ea typeface="Lato"/>
-                <a:cs typeface="Lato"/>
-                <a:sym typeface="Lato"/>
-              </a:rPr>
-              <a:t>¿Cómo afectan los paradigmas de programación, lógico en Prolog y orientado a objetos en JavaScript, a la forma en que abordan los problemas?</a:t>
-            </a:r>
-            <a:endParaRPr sz="1800">
-              <a:solidFill>
-                <a:schemeClr val="lt1"/>
-              </a:solidFill>
-              <a:latin typeface="Lato"/>
-              <a:ea typeface="Lato"/>
-              <a:cs typeface="Lato"/>
-              <a:sym typeface="Lato"/>
-            </a:endParaRPr>
-          </a:p>
-          <a:p>
-            <a:pPr indent="-342900" lvl="0" marL="457200" rtl="0" algn="l">
-              <a:spcBef>
-                <a:spcPts val="0"/>
-              </a:spcBef>
-              <a:spcAft>
-                <a:spcPts val="0"/>
-              </a:spcAft>
-              <a:buClr>
-                <a:schemeClr val="lt1"/>
-              </a:buClr>
-              <a:buSzPts val="1800"/>
-              <a:buFont typeface="Lato"/>
-              <a:buChar char="-"/>
-            </a:pPr>
-            <a:r>
-              <a:rPr lang="en" sz="1800">
-                <a:solidFill>
-                  <a:schemeClr val="lt1"/>
-                </a:solidFill>
-                <a:latin typeface="Lato"/>
-                <a:ea typeface="Lato"/>
-                <a:cs typeface="Lato"/>
-                <a:sym typeface="Lato"/>
-              </a:rPr>
-              <a:t>¿Cómo los resultados obtenidos se usan para la selección de un lenguaje para proyectos reales?</a:t>
-            </a:r>
-            <a:endParaRPr sz="1800">
+              <a:t>Resultados</a:t>
+            </a:r>
+            <a:endParaRPr b="1" sz="3000">
               <a:solidFill>
                 <a:schemeClr val="lt1"/>
               </a:solidFill>
@@ -19029,6 +19733,456 @@
       <p:sp>
         <p:nvSpPr>
           <p:cNvPr id="233" name="Google Shape;233;p27"/>
+          <p:cNvSpPr txBox="1"/>
+          <p:nvPr>
+            <p:ph type="title"/>
+          </p:nvPr>
+        </p:nvSpPr>
+        <p:spPr>
+          <a:xfrm>
+            <a:off x="317300" y="241075"/>
+            <a:ext cx="4587000" cy="1148700"/>
+          </a:xfrm>
+          <a:prstGeom prst="rect">
+            <a:avLst/>
+          </a:prstGeom>
+        </p:spPr>
+        <p:txBody>
+          <a:bodyPr anchorCtr="0" anchor="ctr" bIns="91425" lIns="91425" spcFirstLastPara="1" rIns="91425" wrap="square" tIns="91425">
+            <a:normAutofit/>
+          </a:bodyPr>
+          <a:lstStyle/>
+          <a:p>
+            <a:pPr indent="0" lvl="0" marL="0" rtl="0" algn="l">
+              <a:spcBef>
+                <a:spcPts val="0"/>
+              </a:spcBef>
+              <a:spcAft>
+                <a:spcPts val="0"/>
+              </a:spcAft>
+              <a:buNone/>
+            </a:pPr>
+            <a:r>
+              <a:rPr lang="en" sz="5000"/>
+              <a:t>Conclusiones</a:t>
+            </a:r>
+            <a:endParaRPr sz="5000"/>
+          </a:p>
+        </p:txBody>
+      </p:sp>
+      <p:sp>
+        <p:nvSpPr>
+          <p:cNvPr id="234" name="Google Shape;234;p27"/>
+          <p:cNvSpPr txBox="1"/>
+          <p:nvPr/>
+        </p:nvSpPr>
+        <p:spPr>
+          <a:xfrm>
+            <a:off x="336800" y="1956075"/>
+            <a:ext cx="6994500" cy="2279400"/>
+          </a:xfrm>
+          <a:prstGeom prst="rect">
+            <a:avLst/>
+          </a:prstGeom>
+          <a:noFill/>
+          <a:ln>
+            <a:noFill/>
+          </a:ln>
+        </p:spPr>
+        <p:txBody>
+          <a:bodyPr anchorCtr="0" anchor="t" bIns="91425" lIns="91425" spcFirstLastPara="1" rIns="91425" wrap="square" tIns="91425">
+            <a:noAutofit/>
+          </a:bodyPr>
+          <a:lstStyle/>
+          <a:p>
+            <a:pPr indent="-387350" lvl="0" marL="457200" rtl="0" algn="l">
+              <a:spcBef>
+                <a:spcPts val="0"/>
+              </a:spcBef>
+              <a:spcAft>
+                <a:spcPts val="0"/>
+              </a:spcAft>
+              <a:buClr>
+                <a:schemeClr val="lt1"/>
+              </a:buClr>
+              <a:buSzPts val="2500"/>
+              <a:buFont typeface="Lato"/>
+              <a:buChar char="-"/>
+            </a:pPr>
+            <a:r>
+              <a:rPr lang="en" sz="2500">
+                <a:solidFill>
+                  <a:schemeClr val="lt1"/>
+                </a:solidFill>
+                <a:latin typeface="Lato"/>
+                <a:ea typeface="Lato"/>
+                <a:cs typeface="Lato"/>
+                <a:sym typeface="Lato"/>
+              </a:rPr>
+              <a:t>Compatibilidad con el Tipo de Problema</a:t>
+            </a:r>
+            <a:endParaRPr sz="2500">
+              <a:solidFill>
+                <a:schemeClr val="lt1"/>
+              </a:solidFill>
+              <a:latin typeface="Lato"/>
+              <a:ea typeface="Lato"/>
+              <a:cs typeface="Lato"/>
+              <a:sym typeface="Lato"/>
+            </a:endParaRPr>
+          </a:p>
+          <a:p>
+            <a:pPr indent="0" lvl="0" marL="457200" rtl="0" algn="l">
+              <a:spcBef>
+                <a:spcPts val="0"/>
+              </a:spcBef>
+              <a:spcAft>
+                <a:spcPts val="0"/>
+              </a:spcAft>
+              <a:buNone/>
+            </a:pPr>
+            <a:r>
+              <a:t/>
+            </a:r>
+            <a:endParaRPr sz="2500">
+              <a:solidFill>
+                <a:schemeClr val="lt1"/>
+              </a:solidFill>
+              <a:latin typeface="Lato"/>
+              <a:ea typeface="Lato"/>
+              <a:cs typeface="Lato"/>
+              <a:sym typeface="Lato"/>
+            </a:endParaRPr>
+          </a:p>
+          <a:p>
+            <a:pPr indent="0" lvl="0" marL="457200" rtl="0" algn="l">
+              <a:spcBef>
+                <a:spcPts val="0"/>
+              </a:spcBef>
+              <a:spcAft>
+                <a:spcPts val="0"/>
+              </a:spcAft>
+              <a:buNone/>
+            </a:pPr>
+            <a:r>
+              <a:t/>
+            </a:r>
+            <a:endParaRPr sz="2500">
+              <a:solidFill>
+                <a:schemeClr val="lt1"/>
+              </a:solidFill>
+              <a:latin typeface="Lato"/>
+              <a:ea typeface="Lato"/>
+              <a:cs typeface="Lato"/>
+              <a:sym typeface="Lato"/>
+            </a:endParaRPr>
+          </a:p>
+          <a:p>
+            <a:pPr indent="-387350" lvl="0" marL="457200" rtl="0" algn="l">
+              <a:spcBef>
+                <a:spcPts val="0"/>
+              </a:spcBef>
+              <a:spcAft>
+                <a:spcPts val="0"/>
+              </a:spcAft>
+              <a:buClr>
+                <a:schemeClr val="lt1"/>
+              </a:buClr>
+              <a:buSzPts val="2500"/>
+              <a:buFont typeface="Lato"/>
+              <a:buChar char="-"/>
+            </a:pPr>
+            <a:r>
+              <a:rPr lang="en" sz="2500">
+                <a:solidFill>
+                  <a:schemeClr val="lt1"/>
+                </a:solidFill>
+                <a:latin typeface="Lato"/>
+                <a:ea typeface="Lato"/>
+                <a:cs typeface="Lato"/>
+                <a:sym typeface="Lato"/>
+              </a:rPr>
+              <a:t>Complejidad y Claridad del Código</a:t>
+            </a:r>
+            <a:endParaRPr sz="2500">
+              <a:solidFill>
+                <a:schemeClr val="lt1"/>
+              </a:solidFill>
+              <a:latin typeface="Lato"/>
+              <a:ea typeface="Lato"/>
+              <a:cs typeface="Lato"/>
+              <a:sym typeface="Lato"/>
+            </a:endParaRPr>
+          </a:p>
+        </p:txBody>
+      </p:sp>
+    </p:spTree>
+  </p:cSld>
+  <p:clrMapOvr>
+    <a:masterClrMapping/>
+  </p:clrMapOvr>
+</p:sld>
+</file>
+
+<file path=ppt/slides/slide16.xml><?xml version="1.0" encoding="utf-8"?>
+<p:sld xmlns:a="http://schemas.openxmlformats.org/drawingml/2006/main" xmlns:r="http://schemas.openxmlformats.org/officeDocument/2006/relationships" xmlns:mc="http://schemas.openxmlformats.org/markup-compatibility/2006" xmlns:mv="urn:schemas-microsoft-com:mac:vml" xmlns:p="http://schemas.openxmlformats.org/presentationml/2006/main" xmlns:c="http://schemas.openxmlformats.org/drawingml/2006/chart" xmlns:dgm="http://schemas.openxmlformats.org/drawingml/2006/diagram" xmlns:o="urn:schemas-microsoft-com:office:office" xmlns:v="urn:schemas-microsoft-com:vml" xmlns:pvml="urn:schemas-microsoft-com:office:powerpoint" xmlns:com="http://schemas.openxmlformats.org/drawingml/2006/compatibility" xmlns:p14="http://schemas.microsoft.com/office/powerpoint/2010/main" xmlns:p15="http://schemas.microsoft.com/office/powerpoint/2012/main" xmlns:ahyp="http://schemas.microsoft.com/office/drawing/2018/hyperlinkcolor">
+  <p:cSld>
+    <p:spTree>
+      <p:nvGrpSpPr>
+        <p:cNvPr id="238" name="Shape 238"/>
+        <p:cNvGrpSpPr/>
+        <p:nvPr/>
+      </p:nvGrpSpPr>
+      <p:grpSpPr>
+        <a:xfrm>
+          <a:off x="0" y="0"/>
+          <a:ext cx="0" cy="0"/>
+          <a:chOff x="0" y="0"/>
+          <a:chExt cx="0" cy="0"/>
+        </a:xfrm>
+      </p:grpSpPr>
+      <p:sp>
+        <p:nvSpPr>
+          <p:cNvPr id="239" name="Google Shape;239;p28"/>
+          <p:cNvSpPr txBox="1"/>
+          <p:nvPr>
+            <p:ph type="title"/>
+          </p:nvPr>
+        </p:nvSpPr>
+        <p:spPr>
+          <a:xfrm>
+            <a:off x="336800" y="338500"/>
+            <a:ext cx="4587000" cy="1148700"/>
+          </a:xfrm>
+          <a:prstGeom prst="rect">
+            <a:avLst/>
+          </a:prstGeom>
+        </p:spPr>
+        <p:txBody>
+          <a:bodyPr anchorCtr="0" anchor="ctr" bIns="91425" lIns="91425" spcFirstLastPara="1" rIns="91425" wrap="square" tIns="91425">
+            <a:normAutofit/>
+          </a:bodyPr>
+          <a:lstStyle/>
+          <a:p>
+            <a:pPr indent="0" lvl="0" marL="0" rtl="0" algn="l">
+              <a:spcBef>
+                <a:spcPts val="0"/>
+              </a:spcBef>
+              <a:spcAft>
+                <a:spcPts val="0"/>
+              </a:spcAft>
+              <a:buNone/>
+            </a:pPr>
+            <a:r>
+              <a:rPr lang="en" sz="3000"/>
+              <a:t>Preguntas para pensar</a:t>
+            </a:r>
+            <a:endParaRPr sz="3000"/>
+          </a:p>
+        </p:txBody>
+      </p:sp>
+      <p:sp>
+        <p:nvSpPr>
+          <p:cNvPr id="240" name="Google Shape;240;p28"/>
+          <p:cNvSpPr txBox="1"/>
+          <p:nvPr/>
+        </p:nvSpPr>
+        <p:spPr>
+          <a:xfrm>
+            <a:off x="336800" y="1487200"/>
+            <a:ext cx="6994500" cy="3469200"/>
+          </a:xfrm>
+          <a:prstGeom prst="rect">
+            <a:avLst/>
+          </a:prstGeom>
+          <a:noFill/>
+          <a:ln>
+            <a:noFill/>
+          </a:ln>
+        </p:spPr>
+        <p:txBody>
+          <a:bodyPr anchorCtr="0" anchor="t" bIns="91425" lIns="91425" spcFirstLastPara="1" rIns="91425" wrap="square" tIns="91425">
+            <a:noAutofit/>
+          </a:bodyPr>
+          <a:lstStyle/>
+          <a:p>
+            <a:pPr indent="-342900" lvl="0" marL="457200" rtl="0" algn="l">
+              <a:spcBef>
+                <a:spcPts val="0"/>
+              </a:spcBef>
+              <a:spcAft>
+                <a:spcPts val="0"/>
+              </a:spcAft>
+              <a:buClr>
+                <a:schemeClr val="lt1"/>
+              </a:buClr>
+              <a:buSzPts val="1800"/>
+              <a:buFont typeface="Lato"/>
+              <a:buChar char="-"/>
+            </a:pPr>
+            <a:r>
+              <a:rPr lang="en" sz="1800">
+                <a:solidFill>
+                  <a:schemeClr val="lt1"/>
+                </a:solidFill>
+                <a:latin typeface="Lato"/>
+                <a:ea typeface="Lato"/>
+                <a:cs typeface="Lato"/>
+                <a:sym typeface="Lato"/>
+              </a:rPr>
+              <a:t>¿Cuáles son las ventajas y desventajas de la evaluación perezosa en Prolog y cómo se compara  con la evaluación más inmediata en JavaScript?</a:t>
+            </a:r>
+            <a:endParaRPr sz="1800">
+              <a:solidFill>
+                <a:schemeClr val="lt1"/>
+              </a:solidFill>
+              <a:latin typeface="Lato"/>
+              <a:ea typeface="Lato"/>
+              <a:cs typeface="Lato"/>
+              <a:sym typeface="Lato"/>
+            </a:endParaRPr>
+          </a:p>
+          <a:p>
+            <a:pPr indent="-342900" lvl="0" marL="457200" rtl="0" algn="l">
+              <a:spcBef>
+                <a:spcPts val="0"/>
+              </a:spcBef>
+              <a:spcAft>
+                <a:spcPts val="0"/>
+              </a:spcAft>
+              <a:buClr>
+                <a:schemeClr val="lt1"/>
+              </a:buClr>
+              <a:buSzPts val="1800"/>
+              <a:buFont typeface="Lato"/>
+              <a:buChar char="-"/>
+            </a:pPr>
+            <a:r>
+              <a:rPr lang="en" sz="1800">
+                <a:solidFill>
+                  <a:schemeClr val="lt1"/>
+                </a:solidFill>
+                <a:latin typeface="Lato"/>
+                <a:ea typeface="Lato"/>
+                <a:cs typeface="Lato"/>
+                <a:sym typeface="Lato"/>
+              </a:rPr>
+              <a:t>¿Cómo influyen las diferencias en las optimizaciones internas y las estrategias de administración de memoria en el rendimiento de los algoritmos en ambos lenguajes?</a:t>
+            </a:r>
+            <a:endParaRPr sz="1800">
+              <a:solidFill>
+                <a:schemeClr val="lt1"/>
+              </a:solidFill>
+              <a:latin typeface="Lato"/>
+              <a:ea typeface="Lato"/>
+              <a:cs typeface="Lato"/>
+              <a:sym typeface="Lato"/>
+            </a:endParaRPr>
+          </a:p>
+          <a:p>
+            <a:pPr indent="-342900" lvl="0" marL="457200" rtl="0" algn="l">
+              <a:spcBef>
+                <a:spcPts val="0"/>
+              </a:spcBef>
+              <a:spcAft>
+                <a:spcPts val="0"/>
+              </a:spcAft>
+              <a:buClr>
+                <a:schemeClr val="lt1"/>
+              </a:buClr>
+              <a:buSzPts val="1800"/>
+              <a:buFont typeface="Lato"/>
+              <a:buChar char="-"/>
+            </a:pPr>
+            <a:r>
+              <a:rPr lang="en" sz="1800">
+                <a:solidFill>
+                  <a:schemeClr val="lt1"/>
+                </a:solidFill>
+                <a:latin typeface="Lato"/>
+                <a:ea typeface="Lato"/>
+                <a:cs typeface="Lato"/>
+                <a:sym typeface="Lato"/>
+              </a:rPr>
+              <a:t>¿Cómo afectan los paradigmas de programación, lógico en Prolog y orientado a objetos en JavaScript, a la forma en que abordan los problemas?</a:t>
+            </a:r>
+            <a:endParaRPr sz="1800">
+              <a:solidFill>
+                <a:schemeClr val="lt1"/>
+              </a:solidFill>
+              <a:latin typeface="Lato"/>
+              <a:ea typeface="Lato"/>
+              <a:cs typeface="Lato"/>
+              <a:sym typeface="Lato"/>
+            </a:endParaRPr>
+          </a:p>
+          <a:p>
+            <a:pPr indent="-342900" lvl="0" marL="457200" rtl="0" algn="l">
+              <a:spcBef>
+                <a:spcPts val="0"/>
+              </a:spcBef>
+              <a:spcAft>
+                <a:spcPts val="0"/>
+              </a:spcAft>
+              <a:buClr>
+                <a:schemeClr val="lt1"/>
+              </a:buClr>
+              <a:buSzPts val="1800"/>
+              <a:buFont typeface="Lato"/>
+              <a:buChar char="-"/>
+            </a:pPr>
+            <a:r>
+              <a:rPr lang="en" sz="1800">
+                <a:solidFill>
+                  <a:schemeClr val="lt1"/>
+                </a:solidFill>
+                <a:latin typeface="Lato"/>
+                <a:ea typeface="Lato"/>
+                <a:cs typeface="Lato"/>
+                <a:sym typeface="Lato"/>
+              </a:rPr>
+              <a:t>¿Cómo los resultados obtenidos se usan para la selección de un lenguaje para proyectos reales?</a:t>
+            </a:r>
+            <a:endParaRPr sz="1800">
+              <a:solidFill>
+                <a:schemeClr val="lt1"/>
+              </a:solidFill>
+              <a:latin typeface="Lato"/>
+              <a:ea typeface="Lato"/>
+              <a:cs typeface="Lato"/>
+              <a:sym typeface="Lato"/>
+            </a:endParaRPr>
+          </a:p>
+        </p:txBody>
+      </p:sp>
+    </p:spTree>
+  </p:cSld>
+  <p:clrMapOvr>
+    <a:masterClrMapping/>
+  </p:clrMapOvr>
+</p:sld>
+</file>
+
+<file path=ppt/slides/slide17.xml><?xml version="1.0" encoding="utf-8"?>
+<p:sld xmlns:a="http://schemas.openxmlformats.org/drawingml/2006/main" xmlns:r="http://schemas.openxmlformats.org/officeDocument/2006/relationships" xmlns:mc="http://schemas.openxmlformats.org/markup-compatibility/2006" xmlns:mv="urn:schemas-microsoft-com:mac:vml" xmlns:p="http://schemas.openxmlformats.org/presentationml/2006/main" xmlns:c="http://schemas.openxmlformats.org/drawingml/2006/chart" xmlns:dgm="http://schemas.openxmlformats.org/drawingml/2006/diagram" xmlns:o="urn:schemas-microsoft-com:office:office" xmlns:v="urn:schemas-microsoft-com:vml" xmlns:pvml="urn:schemas-microsoft-com:office:powerpoint" xmlns:com="http://schemas.openxmlformats.org/drawingml/2006/compatibility" xmlns:p14="http://schemas.microsoft.com/office/powerpoint/2010/main" xmlns:p15="http://schemas.microsoft.com/office/powerpoint/2012/main" xmlns:ahyp="http://schemas.microsoft.com/office/drawing/2018/hyperlinkcolor">
+  <p:cSld>
+    <p:spTree>
+      <p:nvGrpSpPr>
+        <p:cNvPr id="244" name="Shape 244"/>
+        <p:cNvGrpSpPr/>
+        <p:nvPr/>
+      </p:nvGrpSpPr>
+      <p:grpSpPr>
+        <a:xfrm>
+          <a:off x="0" y="0"/>
+          <a:ext cx="0" cy="0"/>
+          <a:chOff x="0" y="0"/>
+          <a:chExt cx="0" cy="0"/>
+        </a:xfrm>
+      </p:grpSpPr>
+      <p:sp>
+        <p:nvSpPr>
+          <p:cNvPr id="245" name="Google Shape;245;p29"/>
           <p:cNvSpPr txBox="1"/>
           <p:nvPr>
             <p:ph type="title"/>

</xml_diff>